<commit_message>
everything updated, indentified duplicate values in name from customer cleanup, insights powerpoint completed
</commit_message>
<xml_diff>
--- a/insights.pptx
+++ b/insights.pptx
@@ -3977,7 +3977,28 @@
           <a:bodyPr/>
           <a:lstStyle/>
           <a:p>
-            <a:endParaRPr lang="en-US" dirty="0"/>
+            <a:r>
+              <a:rPr lang="en-US" dirty="0"/>
+              <a:t>The dataset was received in one large column and must be separated into individual columns</a:t>
+            </a:r>
+          </a:p>
+          <a:p>
+            <a:r>
+              <a:rPr lang="en-US" dirty="0"/>
+              <a:t>There were about 5 duplicate values within the data having the same name and email but different phone numbers</a:t>
+            </a:r>
+          </a:p>
+          <a:p>
+            <a:r>
+              <a:rPr lang="en-US" dirty="0"/>
+              <a:t>I decided to keep the first occurrence of these duplicates</a:t>
+            </a:r>
+          </a:p>
+          <a:p>
+            <a:r>
+              <a:rPr lang="en-US" dirty="0"/>
+              <a:t>It was difficult for me to clean up the data in ‘phone’ column, so I took the easier route and converted the data to a str</a:t>
+            </a:r>
           </a:p>
         </p:txBody>
       </p:sp>
@@ -4057,10 +4078,39 @@
         </p:nvSpPr>
         <p:spPr/>
         <p:txBody>
-          <a:bodyPr/>
-          <a:lstStyle/>
-          <a:p>
-            <a:endParaRPr lang="en-US"/>
+          <a:bodyPr>
+            <a:normAutofit lnSpcReduction="10000"/>
+          </a:bodyPr>
+          <a:lstStyle/>
+          <a:p>
+            <a:r>
+              <a:rPr lang="en-US" dirty="0"/>
+              <a:t>This dataset is filled with duplicates and must be normalized</a:t>
+            </a:r>
+          </a:p>
+          <a:p>
+            <a:r>
+              <a:rPr lang="en-US" dirty="0"/>
+              <a:t>Drop columns I don’t find useful for analysis</a:t>
+            </a:r>
+          </a:p>
+          <a:p>
+            <a:r>
+              <a:rPr lang="en-US" dirty="0"/>
+              <a:t>Separate the DataFrame based on certain parameters to pull insights from those datasets without duplicates</a:t>
+            </a:r>
+          </a:p>
+          <a:p>
+            <a:r>
+              <a:rPr lang="en-US" dirty="0"/>
+              <a:t>For the analysis I want a statistical summary for object type data as well</a:t>
+            </a:r>
+          </a:p>
+          <a:p>
+            <a:r>
+              <a:rPr lang="en-US" dirty="0"/>
+              <a:t>Rank and sort highest revenue and most products sold by Employee, Vendor, and Product</a:t>
+            </a:r>
           </a:p>
         </p:txBody>
       </p:sp>
@@ -4140,10 +4190,75 @@
         </p:nvSpPr>
         <p:spPr/>
         <p:txBody>
-          <a:bodyPr/>
-          <a:lstStyle/>
-          <a:p>
-            <a:endParaRPr lang="en-US"/>
+          <a:bodyPr>
+            <a:normAutofit fontScale="92500" lnSpcReduction="20000"/>
+          </a:bodyPr>
+          <a:lstStyle/>
+          <a:p>
+            <a:r>
+              <a:rPr lang="en-US" dirty="0"/>
+              <a:t>Margaret Peacock deserves a huge bonus </a:t>
+            </a:r>
+            <a:r>
+              <a:rPr lang="en-US" altLang="ja-JP" dirty="0"/>
+              <a:t>¯\_(</a:t>
+            </a:r>
+            <a:r>
+              <a:rPr lang="ja-JP" altLang="en-US" dirty="0"/>
+              <a:t>ツ</a:t>
+            </a:r>
+            <a:r>
+              <a:rPr lang="en-US" altLang="ja-JP" dirty="0"/>
+              <a:t>)_/¯</a:t>
+            </a:r>
+          </a:p>
+          <a:p>
+            <a:r>
+              <a:rPr lang="en-US" dirty="0"/>
+              <a:t>Plutzer AG is our most profitable vendor</a:t>
+            </a:r>
+          </a:p>
+          <a:p>
+            <a:r>
+              <a:rPr lang="en-US" dirty="0"/>
+              <a:t>Our most popular products are Thringer Rostbratwurst(Highest revenue) and Gnocchi di nonna Alice(most sold and 5</a:t>
+            </a:r>
+            <a:r>
+              <a:rPr lang="en-US" baseline="30000" dirty="0"/>
+              <a:t>th</a:t>
+            </a:r>
+            <a:r>
+              <a:rPr lang="en-US" dirty="0"/>
+              <a:t> highest revenue)</a:t>
+            </a:r>
+          </a:p>
+          <a:p>
+            <a:r>
+              <a:rPr lang="en-US" dirty="0"/>
+              <a:t>Our customer Grace Adler on average buys the most and spends the most money</a:t>
+            </a:r>
+          </a:p>
+          <a:p>
+            <a:r>
+              <a:rPr lang="en-US" dirty="0"/>
+              <a:t>Our customer J. Lannister has bought 2</a:t>
+            </a:r>
+            <a:r>
+              <a:rPr lang="en-US" baseline="30000" dirty="0"/>
+              <a:t>nd</a:t>
+            </a:r>
+            <a:r>
+              <a:rPr lang="en-US" dirty="0"/>
+              <a:t> most total and spent the most total while Mike E. has bought the most total and spent the 3</a:t>
+            </a:r>
+            <a:r>
+              <a:rPr lang="en-US" baseline="30000" dirty="0"/>
+              <a:t>rd</a:t>
+            </a:r>
+            <a:r>
+              <a:rPr lang="en-US" dirty="0"/>
+              <a:t> most total</a:t>
+            </a:r>
           </a:p>
         </p:txBody>
       </p:sp>

</xml_diff>